<commit_message>
Updated figures fonts to make them all consistent
</commit_message>
<xml_diff>
--- a/manuscript/Figures/FlowChart.pptx
+++ b/manuscript/Figures/FlowChart.pptx
@@ -128,7 +128,7 @@
   <pc:docChgLst>
     <pc:chgData name="Fatima Pillosu" userId="a6295d4dc9e22643" providerId="LiveId" clId="{B303C878-8799-4007-876A-6617B70F571A}"/>
     <pc:docChg chg="undo redo custSel addSld delSld modSld">
-      <pc:chgData name="Fatima Pillosu" userId="a6295d4dc9e22643" providerId="LiveId" clId="{B303C878-8799-4007-876A-6617B70F571A}" dt="2020-12-03T09:59:07.009" v="7895" actId="1036"/>
+      <pc:chgData name="Fatima Pillosu" userId="a6295d4dc9e22643" providerId="LiveId" clId="{B303C878-8799-4007-876A-6617B70F571A}" dt="2020-12-03T11:54:02.296" v="7896" actId="2711"/>
       <pc:docMkLst>
         <pc:docMk/>
       </pc:docMkLst>
@@ -140,7 +140,7 @@
         </pc:sldMkLst>
       </pc:sldChg>
       <pc:sldChg chg="addSp delSp modSp add del">
-        <pc:chgData name="Fatima Pillosu" userId="a6295d4dc9e22643" providerId="LiveId" clId="{B303C878-8799-4007-876A-6617B70F571A}" dt="2020-12-03T09:59:07.009" v="7895" actId="1036"/>
+        <pc:chgData name="Fatima Pillosu" userId="a6295d4dc9e22643" providerId="LiveId" clId="{B303C878-8799-4007-876A-6617B70F571A}" dt="2020-12-03T11:54:02.296" v="7896" actId="2711"/>
         <pc:sldMkLst>
           <pc:docMk/>
           <pc:sldMk cId="2969362105" sldId="256"/>
@@ -4434,7 +4434,7 @@
           </ac:spMkLst>
         </pc:spChg>
         <pc:spChg chg="add mod">
-          <ac:chgData name="Fatima Pillosu" userId="a6295d4dc9e22643" providerId="LiveId" clId="{B303C878-8799-4007-876A-6617B70F571A}" dt="2020-12-03T09:59:07.009" v="7895" actId="1036"/>
+          <ac:chgData name="Fatima Pillosu" userId="a6295d4dc9e22643" providerId="LiveId" clId="{B303C878-8799-4007-876A-6617B70F571A}" dt="2020-12-03T11:54:02.296" v="7896" actId="2711"/>
           <ac:spMkLst>
             <pc:docMk/>
             <pc:sldMk cId="2969362105" sldId="256"/>
@@ -4450,7 +4450,7 @@
           </ac:spMkLst>
         </pc:spChg>
         <pc:spChg chg="add mod">
-          <ac:chgData name="Fatima Pillosu" userId="a6295d4dc9e22643" providerId="LiveId" clId="{B303C878-8799-4007-876A-6617B70F571A}" dt="2020-12-03T09:59:07.009" v="7895" actId="1036"/>
+          <ac:chgData name="Fatima Pillosu" userId="a6295d4dc9e22643" providerId="LiveId" clId="{B303C878-8799-4007-876A-6617B70F571A}" dt="2020-12-03T11:54:02.296" v="7896" actId="2711"/>
           <ac:spMkLst>
             <pc:docMk/>
             <pc:sldMk cId="2969362105" sldId="256"/>
@@ -4474,7 +4474,7 @@
           </ac:spMkLst>
         </pc:spChg>
         <pc:spChg chg="add mod">
-          <ac:chgData name="Fatima Pillosu" userId="a6295d4dc9e22643" providerId="LiveId" clId="{B303C878-8799-4007-876A-6617B70F571A}" dt="2020-12-03T09:59:07.009" v="7895" actId="1036"/>
+          <ac:chgData name="Fatima Pillosu" userId="a6295d4dc9e22643" providerId="LiveId" clId="{B303C878-8799-4007-876A-6617B70F571A}" dt="2020-12-03T11:54:02.296" v="7896" actId="2711"/>
           <ac:spMkLst>
             <pc:docMk/>
             <pc:sldMk cId="2969362105" sldId="256"/>
@@ -4490,7 +4490,7 @@
           </ac:spMkLst>
         </pc:spChg>
         <pc:spChg chg="add mod">
-          <ac:chgData name="Fatima Pillosu" userId="a6295d4dc9e22643" providerId="LiveId" clId="{B303C878-8799-4007-876A-6617B70F571A}" dt="2020-12-03T09:59:07.009" v="7895" actId="1036"/>
+          <ac:chgData name="Fatima Pillosu" userId="a6295d4dc9e22643" providerId="LiveId" clId="{B303C878-8799-4007-876A-6617B70F571A}" dt="2020-12-03T11:54:02.296" v="7896" actId="2711"/>
           <ac:spMkLst>
             <pc:docMk/>
             <pc:sldMk cId="2969362105" sldId="256"/>
@@ -4498,7 +4498,7 @@
           </ac:spMkLst>
         </pc:spChg>
         <pc:spChg chg="add mod">
-          <ac:chgData name="Fatima Pillosu" userId="a6295d4dc9e22643" providerId="LiveId" clId="{B303C878-8799-4007-876A-6617B70F571A}" dt="2020-12-03T09:59:07.009" v="7895" actId="1036"/>
+          <ac:chgData name="Fatima Pillosu" userId="a6295d4dc9e22643" providerId="LiveId" clId="{B303C878-8799-4007-876A-6617B70F571A}" dt="2020-12-03T11:54:02.296" v="7896" actId="2711"/>
           <ac:spMkLst>
             <pc:docMk/>
             <pc:sldMk cId="2969362105" sldId="256"/>
@@ -4522,7 +4522,7 @@
           </ac:spMkLst>
         </pc:spChg>
         <pc:spChg chg="add mod">
-          <ac:chgData name="Fatima Pillosu" userId="a6295d4dc9e22643" providerId="LiveId" clId="{B303C878-8799-4007-876A-6617B70F571A}" dt="2020-12-03T09:59:07.009" v="7895" actId="1036"/>
+          <ac:chgData name="Fatima Pillosu" userId="a6295d4dc9e22643" providerId="LiveId" clId="{B303C878-8799-4007-876A-6617B70F571A}" dt="2020-12-03T11:54:02.296" v="7896" actId="2711"/>
           <ac:spMkLst>
             <pc:docMk/>
             <pc:sldMk cId="2969362105" sldId="256"/>
@@ -4530,7 +4530,7 @@
           </ac:spMkLst>
         </pc:spChg>
         <pc:spChg chg="add mod">
-          <ac:chgData name="Fatima Pillosu" userId="a6295d4dc9e22643" providerId="LiveId" clId="{B303C878-8799-4007-876A-6617B70F571A}" dt="2020-12-03T09:59:07.009" v="7895" actId="1036"/>
+          <ac:chgData name="Fatima Pillosu" userId="a6295d4dc9e22643" providerId="LiveId" clId="{B303C878-8799-4007-876A-6617B70F571A}" dt="2020-12-03T11:54:02.296" v="7896" actId="2711"/>
           <ac:spMkLst>
             <pc:docMk/>
             <pc:sldMk cId="2969362105" sldId="256"/>
@@ -4562,7 +4562,7 @@
           </ac:spMkLst>
         </pc:spChg>
         <pc:spChg chg="add mod">
-          <ac:chgData name="Fatima Pillosu" userId="a6295d4dc9e22643" providerId="LiveId" clId="{B303C878-8799-4007-876A-6617B70F571A}" dt="2020-12-03T09:59:07.009" v="7895" actId="1036"/>
+          <ac:chgData name="Fatima Pillosu" userId="a6295d4dc9e22643" providerId="LiveId" clId="{B303C878-8799-4007-876A-6617B70F571A}" dt="2020-12-03T11:54:02.296" v="7896" actId="2711"/>
           <ac:spMkLst>
             <pc:docMk/>
             <pc:sldMk cId="2969362105" sldId="256"/>
@@ -4578,7 +4578,7 @@
           </ac:spMkLst>
         </pc:spChg>
         <pc:spChg chg="add mod">
-          <ac:chgData name="Fatima Pillosu" userId="a6295d4dc9e22643" providerId="LiveId" clId="{B303C878-8799-4007-876A-6617B70F571A}" dt="2020-12-03T09:59:07.009" v="7895" actId="1036"/>
+          <ac:chgData name="Fatima Pillosu" userId="a6295d4dc9e22643" providerId="LiveId" clId="{B303C878-8799-4007-876A-6617B70F571A}" dt="2020-12-03T11:54:02.296" v="7896" actId="2711"/>
           <ac:spMkLst>
             <pc:docMk/>
             <pc:sldMk cId="2969362105" sldId="256"/>
@@ -4602,7 +4602,7 @@
           </ac:spMkLst>
         </pc:spChg>
         <pc:spChg chg="add mod">
-          <ac:chgData name="Fatima Pillosu" userId="a6295d4dc9e22643" providerId="LiveId" clId="{B303C878-8799-4007-876A-6617B70F571A}" dt="2020-12-03T09:59:07.009" v="7895" actId="1036"/>
+          <ac:chgData name="Fatima Pillosu" userId="a6295d4dc9e22643" providerId="LiveId" clId="{B303C878-8799-4007-876A-6617B70F571A}" dt="2020-12-03T11:54:02.296" v="7896" actId="2711"/>
           <ac:spMkLst>
             <pc:docMk/>
             <pc:sldMk cId="2969362105" sldId="256"/>
@@ -4610,7 +4610,7 @@
           </ac:spMkLst>
         </pc:spChg>
         <pc:spChg chg="add mod">
-          <ac:chgData name="Fatima Pillosu" userId="a6295d4dc9e22643" providerId="LiveId" clId="{B303C878-8799-4007-876A-6617B70F571A}" dt="2020-12-03T09:59:07.009" v="7895" actId="1036"/>
+          <ac:chgData name="Fatima Pillosu" userId="a6295d4dc9e22643" providerId="LiveId" clId="{B303C878-8799-4007-876A-6617B70F571A}" dt="2020-12-03T11:54:02.296" v="7896" actId="2711"/>
           <ac:spMkLst>
             <pc:docMk/>
             <pc:sldMk cId="2969362105" sldId="256"/>
@@ -4626,7 +4626,7 @@
           </ac:spMkLst>
         </pc:spChg>
         <pc:spChg chg="add mod">
-          <ac:chgData name="Fatima Pillosu" userId="a6295d4dc9e22643" providerId="LiveId" clId="{B303C878-8799-4007-876A-6617B70F571A}" dt="2020-12-03T09:59:07.009" v="7895" actId="1036"/>
+          <ac:chgData name="Fatima Pillosu" userId="a6295d4dc9e22643" providerId="LiveId" clId="{B303C878-8799-4007-876A-6617B70F571A}" dt="2020-12-03T11:54:02.296" v="7896" actId="2711"/>
           <ac:spMkLst>
             <pc:docMk/>
             <pc:sldMk cId="2969362105" sldId="256"/>
@@ -4634,7 +4634,7 @@
           </ac:spMkLst>
         </pc:spChg>
         <pc:spChg chg="add mod">
-          <ac:chgData name="Fatima Pillosu" userId="a6295d4dc9e22643" providerId="LiveId" clId="{B303C878-8799-4007-876A-6617B70F571A}" dt="2020-12-03T09:59:07.009" v="7895" actId="1036"/>
+          <ac:chgData name="Fatima Pillosu" userId="a6295d4dc9e22643" providerId="LiveId" clId="{B303C878-8799-4007-876A-6617B70F571A}" dt="2020-12-03T11:54:02.296" v="7896" actId="2711"/>
           <ac:spMkLst>
             <pc:docMk/>
             <pc:sldMk cId="2969362105" sldId="256"/>
@@ -4658,7 +4658,7 @@
           </ac:spMkLst>
         </pc:spChg>
         <pc:spChg chg="add mod">
-          <ac:chgData name="Fatima Pillosu" userId="a6295d4dc9e22643" providerId="LiveId" clId="{B303C878-8799-4007-876A-6617B70F571A}" dt="2020-12-03T09:59:07.009" v="7895" actId="1036"/>
+          <ac:chgData name="Fatima Pillosu" userId="a6295d4dc9e22643" providerId="LiveId" clId="{B303C878-8799-4007-876A-6617B70F571A}" dt="2020-12-03T11:54:02.296" v="7896" actId="2711"/>
           <ac:spMkLst>
             <pc:docMk/>
             <pc:sldMk cId="2969362105" sldId="256"/>
@@ -4674,7 +4674,7 @@
           </ac:spMkLst>
         </pc:spChg>
         <pc:spChg chg="add mod">
-          <ac:chgData name="Fatima Pillosu" userId="a6295d4dc9e22643" providerId="LiveId" clId="{B303C878-8799-4007-876A-6617B70F571A}" dt="2020-12-03T09:59:07.009" v="7895" actId="1036"/>
+          <ac:chgData name="Fatima Pillosu" userId="a6295d4dc9e22643" providerId="LiveId" clId="{B303C878-8799-4007-876A-6617B70F571A}" dt="2020-12-03T11:54:02.296" v="7896" actId="2711"/>
           <ac:spMkLst>
             <pc:docMk/>
             <pc:sldMk cId="2969362105" sldId="256"/>
@@ -4682,7 +4682,7 @@
           </ac:spMkLst>
         </pc:spChg>
         <pc:spChg chg="add mod">
-          <ac:chgData name="Fatima Pillosu" userId="a6295d4dc9e22643" providerId="LiveId" clId="{B303C878-8799-4007-876A-6617B70F571A}" dt="2020-12-03T09:59:07.009" v="7895" actId="1036"/>
+          <ac:chgData name="Fatima Pillosu" userId="a6295d4dc9e22643" providerId="LiveId" clId="{B303C878-8799-4007-876A-6617B70F571A}" dt="2020-12-03T11:54:02.296" v="7896" actId="2711"/>
           <ac:spMkLst>
             <pc:docMk/>
             <pc:sldMk cId="2969362105" sldId="256"/>
@@ -4690,7 +4690,7 @@
           </ac:spMkLst>
         </pc:spChg>
         <pc:spChg chg="add mod">
-          <ac:chgData name="Fatima Pillosu" userId="a6295d4dc9e22643" providerId="LiveId" clId="{B303C878-8799-4007-876A-6617B70F571A}" dt="2020-12-03T09:59:07.009" v="7895" actId="1036"/>
+          <ac:chgData name="Fatima Pillosu" userId="a6295d4dc9e22643" providerId="LiveId" clId="{B303C878-8799-4007-876A-6617B70F571A}" dt="2020-12-03T11:54:02.296" v="7896" actId="2711"/>
           <ac:spMkLst>
             <pc:docMk/>
             <pc:sldMk cId="2969362105" sldId="256"/>
@@ -4706,7 +4706,7 @@
           </ac:spMkLst>
         </pc:spChg>
         <pc:spChg chg="add mod">
-          <ac:chgData name="Fatima Pillosu" userId="a6295d4dc9e22643" providerId="LiveId" clId="{B303C878-8799-4007-876A-6617B70F571A}" dt="2020-12-03T09:59:07.009" v="7895" actId="1036"/>
+          <ac:chgData name="Fatima Pillosu" userId="a6295d4dc9e22643" providerId="LiveId" clId="{B303C878-8799-4007-876A-6617B70F571A}" dt="2020-12-03T11:54:02.296" v="7896" actId="2711"/>
           <ac:spMkLst>
             <pc:docMk/>
             <pc:sldMk cId="2969362105" sldId="256"/>
@@ -4722,7 +4722,7 @@
           </ac:spMkLst>
         </pc:spChg>
         <pc:spChg chg="add mod">
-          <ac:chgData name="Fatima Pillosu" userId="a6295d4dc9e22643" providerId="LiveId" clId="{B303C878-8799-4007-876A-6617B70F571A}" dt="2020-12-03T09:59:07.009" v="7895" actId="1036"/>
+          <ac:chgData name="Fatima Pillosu" userId="a6295d4dc9e22643" providerId="LiveId" clId="{B303C878-8799-4007-876A-6617B70F571A}" dt="2020-12-03T11:54:02.296" v="7896" actId="2711"/>
           <ac:spMkLst>
             <pc:docMk/>
             <pc:sldMk cId="2969362105" sldId="256"/>
@@ -4730,7 +4730,7 @@
           </ac:spMkLst>
         </pc:spChg>
         <pc:spChg chg="add mod">
-          <ac:chgData name="Fatima Pillosu" userId="a6295d4dc9e22643" providerId="LiveId" clId="{B303C878-8799-4007-876A-6617B70F571A}" dt="2020-12-03T09:59:07.009" v="7895" actId="1036"/>
+          <ac:chgData name="Fatima Pillosu" userId="a6295d4dc9e22643" providerId="LiveId" clId="{B303C878-8799-4007-876A-6617B70F571A}" dt="2020-12-03T11:54:02.296" v="7896" actId="2711"/>
           <ac:spMkLst>
             <pc:docMk/>
             <pc:sldMk cId="2969362105" sldId="256"/>
@@ -4746,7 +4746,7 @@
           </ac:spMkLst>
         </pc:spChg>
         <pc:spChg chg="add mod">
-          <ac:chgData name="Fatima Pillosu" userId="a6295d4dc9e22643" providerId="LiveId" clId="{B303C878-8799-4007-876A-6617B70F571A}" dt="2020-12-03T09:59:07.009" v="7895" actId="1036"/>
+          <ac:chgData name="Fatima Pillosu" userId="a6295d4dc9e22643" providerId="LiveId" clId="{B303C878-8799-4007-876A-6617B70F571A}" dt="2020-12-03T11:54:02.296" v="7896" actId="2711"/>
           <ac:spMkLst>
             <pc:docMk/>
             <pc:sldMk cId="2969362105" sldId="256"/>
@@ -4754,7 +4754,7 @@
           </ac:spMkLst>
         </pc:spChg>
         <pc:spChg chg="add mod">
-          <ac:chgData name="Fatima Pillosu" userId="a6295d4dc9e22643" providerId="LiveId" clId="{B303C878-8799-4007-876A-6617B70F571A}" dt="2020-12-03T09:59:07.009" v="7895" actId="1036"/>
+          <ac:chgData name="Fatima Pillosu" userId="a6295d4dc9e22643" providerId="LiveId" clId="{B303C878-8799-4007-876A-6617B70F571A}" dt="2020-12-03T11:54:02.296" v="7896" actId="2711"/>
           <ac:spMkLst>
             <pc:docMk/>
             <pc:sldMk cId="2969362105" sldId="256"/>
@@ -4770,7 +4770,7 @@
           </ac:spMkLst>
         </pc:spChg>
         <pc:spChg chg="add mod">
-          <ac:chgData name="Fatima Pillosu" userId="a6295d4dc9e22643" providerId="LiveId" clId="{B303C878-8799-4007-876A-6617B70F571A}" dt="2020-12-03T09:59:07.009" v="7895" actId="1036"/>
+          <ac:chgData name="Fatima Pillosu" userId="a6295d4dc9e22643" providerId="LiveId" clId="{B303C878-8799-4007-876A-6617B70F571A}" dt="2020-12-03T11:54:02.296" v="7896" actId="2711"/>
           <ac:spMkLst>
             <pc:docMk/>
             <pc:sldMk cId="2969362105" sldId="256"/>
@@ -4810,7 +4810,7 @@
           </ac:spMkLst>
         </pc:spChg>
         <pc:spChg chg="add mod">
-          <ac:chgData name="Fatima Pillosu" userId="a6295d4dc9e22643" providerId="LiveId" clId="{B303C878-8799-4007-876A-6617B70F571A}" dt="2020-12-03T09:59:07.009" v="7895" actId="1036"/>
+          <ac:chgData name="Fatima Pillosu" userId="a6295d4dc9e22643" providerId="LiveId" clId="{B303C878-8799-4007-876A-6617B70F571A}" dt="2020-12-03T11:54:02.296" v="7896" actId="2711"/>
           <ac:spMkLst>
             <pc:docMk/>
             <pc:sldMk cId="2969362105" sldId="256"/>
@@ -4818,7 +4818,7 @@
           </ac:spMkLst>
         </pc:spChg>
         <pc:spChg chg="add mod">
-          <ac:chgData name="Fatima Pillosu" userId="a6295d4dc9e22643" providerId="LiveId" clId="{B303C878-8799-4007-876A-6617B70F571A}" dt="2020-12-03T09:59:07.009" v="7895" actId="1036"/>
+          <ac:chgData name="Fatima Pillosu" userId="a6295d4dc9e22643" providerId="LiveId" clId="{B303C878-8799-4007-876A-6617B70F571A}" dt="2020-12-03T11:54:02.296" v="7896" actId="2711"/>
           <ac:spMkLst>
             <pc:docMk/>
             <pc:sldMk cId="2969362105" sldId="256"/>
@@ -4834,7 +4834,7 @@
           </ac:spMkLst>
         </pc:spChg>
         <pc:spChg chg="add mod">
-          <ac:chgData name="Fatima Pillosu" userId="a6295d4dc9e22643" providerId="LiveId" clId="{B303C878-8799-4007-876A-6617B70F571A}" dt="2020-12-03T09:59:07.009" v="7895" actId="1036"/>
+          <ac:chgData name="Fatima Pillosu" userId="a6295d4dc9e22643" providerId="LiveId" clId="{B303C878-8799-4007-876A-6617B70F571A}" dt="2020-12-03T11:54:02.296" v="7896" actId="2711"/>
           <ac:spMkLst>
             <pc:docMk/>
             <pc:sldMk cId="2969362105" sldId="256"/>
@@ -4850,7 +4850,7 @@
           </ac:spMkLst>
         </pc:spChg>
         <pc:spChg chg="add mod">
-          <ac:chgData name="Fatima Pillosu" userId="a6295d4dc9e22643" providerId="LiveId" clId="{B303C878-8799-4007-876A-6617B70F571A}" dt="2020-12-03T09:59:07.009" v="7895" actId="1036"/>
+          <ac:chgData name="Fatima Pillosu" userId="a6295d4dc9e22643" providerId="LiveId" clId="{B303C878-8799-4007-876A-6617B70F571A}" dt="2020-12-03T11:54:02.296" v="7896" actId="2711"/>
           <ac:spMkLst>
             <pc:docMk/>
             <pc:sldMk cId="2969362105" sldId="256"/>
@@ -4858,7 +4858,7 @@
           </ac:spMkLst>
         </pc:spChg>
         <pc:spChg chg="add mod">
-          <ac:chgData name="Fatima Pillosu" userId="a6295d4dc9e22643" providerId="LiveId" clId="{B303C878-8799-4007-876A-6617B70F571A}" dt="2020-12-03T09:59:07.009" v="7895" actId="1036"/>
+          <ac:chgData name="Fatima Pillosu" userId="a6295d4dc9e22643" providerId="LiveId" clId="{B303C878-8799-4007-876A-6617B70F571A}" dt="2020-12-03T11:54:02.296" v="7896" actId="2711"/>
           <ac:spMkLst>
             <pc:docMk/>
             <pc:sldMk cId="2969362105" sldId="256"/>
@@ -4882,7 +4882,7 @@
           </ac:spMkLst>
         </pc:spChg>
         <pc:spChg chg="add mod">
-          <ac:chgData name="Fatima Pillosu" userId="a6295d4dc9e22643" providerId="LiveId" clId="{B303C878-8799-4007-876A-6617B70F571A}" dt="2020-12-03T09:59:07.009" v="7895" actId="1036"/>
+          <ac:chgData name="Fatima Pillosu" userId="a6295d4dc9e22643" providerId="LiveId" clId="{B303C878-8799-4007-876A-6617B70F571A}" dt="2020-12-03T11:54:02.296" v="7896" actId="2711"/>
           <ac:spMkLst>
             <pc:docMk/>
             <pc:sldMk cId="2969362105" sldId="256"/>
@@ -4898,7 +4898,7 @@
           </ac:spMkLst>
         </pc:spChg>
         <pc:spChg chg="add mod">
-          <ac:chgData name="Fatima Pillosu" userId="a6295d4dc9e22643" providerId="LiveId" clId="{B303C878-8799-4007-876A-6617B70F571A}" dt="2020-12-03T09:59:07.009" v="7895" actId="1036"/>
+          <ac:chgData name="Fatima Pillosu" userId="a6295d4dc9e22643" providerId="LiveId" clId="{B303C878-8799-4007-876A-6617B70F571A}" dt="2020-12-03T11:54:02.296" v="7896" actId="2711"/>
           <ac:spMkLst>
             <pc:docMk/>
             <pc:sldMk cId="2969362105" sldId="256"/>
@@ -4914,7 +4914,7 @@
           </ac:spMkLst>
         </pc:spChg>
         <pc:spChg chg="add mod">
-          <ac:chgData name="Fatima Pillosu" userId="a6295d4dc9e22643" providerId="LiveId" clId="{B303C878-8799-4007-876A-6617B70F571A}" dt="2020-12-03T09:59:07.009" v="7895" actId="1036"/>
+          <ac:chgData name="Fatima Pillosu" userId="a6295d4dc9e22643" providerId="LiveId" clId="{B303C878-8799-4007-876A-6617B70F571A}" dt="2020-12-03T11:54:02.296" v="7896" actId="2711"/>
           <ac:spMkLst>
             <pc:docMk/>
             <pc:sldMk cId="2969362105" sldId="256"/>
@@ -4930,7 +4930,7 @@
           </ac:spMkLst>
         </pc:spChg>
         <pc:spChg chg="add mod">
-          <ac:chgData name="Fatima Pillosu" userId="a6295d4dc9e22643" providerId="LiveId" clId="{B303C878-8799-4007-876A-6617B70F571A}" dt="2020-12-03T09:59:07.009" v="7895" actId="1036"/>
+          <ac:chgData name="Fatima Pillosu" userId="a6295d4dc9e22643" providerId="LiveId" clId="{B303C878-8799-4007-876A-6617B70F571A}" dt="2020-12-03T11:54:02.296" v="7896" actId="2711"/>
           <ac:spMkLst>
             <pc:docMk/>
             <pc:sldMk cId="2969362105" sldId="256"/>
@@ -4938,7 +4938,7 @@
           </ac:spMkLst>
         </pc:spChg>
         <pc:spChg chg="add mod">
-          <ac:chgData name="Fatima Pillosu" userId="a6295d4dc9e22643" providerId="LiveId" clId="{B303C878-8799-4007-876A-6617B70F571A}" dt="2020-12-03T09:59:07.009" v="7895" actId="1036"/>
+          <ac:chgData name="Fatima Pillosu" userId="a6295d4dc9e22643" providerId="LiveId" clId="{B303C878-8799-4007-876A-6617B70F571A}" dt="2020-12-03T11:54:02.296" v="7896" actId="2711"/>
           <ac:spMkLst>
             <pc:docMk/>
             <pc:sldMk cId="2969362105" sldId="256"/>
@@ -4946,7 +4946,7 @@
           </ac:spMkLst>
         </pc:spChg>
         <pc:spChg chg="add mod">
-          <ac:chgData name="Fatima Pillosu" userId="a6295d4dc9e22643" providerId="LiveId" clId="{B303C878-8799-4007-876A-6617B70F571A}" dt="2020-12-03T09:59:07.009" v="7895" actId="1036"/>
+          <ac:chgData name="Fatima Pillosu" userId="a6295d4dc9e22643" providerId="LiveId" clId="{B303C878-8799-4007-876A-6617B70F571A}" dt="2020-12-03T11:54:02.296" v="7896" actId="2711"/>
           <ac:spMkLst>
             <pc:docMk/>
             <pc:sldMk cId="2969362105" sldId="256"/>
@@ -4954,7 +4954,7 @@
           </ac:spMkLst>
         </pc:spChg>
         <pc:spChg chg="add mod">
-          <ac:chgData name="Fatima Pillosu" userId="a6295d4dc9e22643" providerId="LiveId" clId="{B303C878-8799-4007-876A-6617B70F571A}" dt="2020-12-03T09:59:07.009" v="7895" actId="1036"/>
+          <ac:chgData name="Fatima Pillosu" userId="a6295d4dc9e22643" providerId="LiveId" clId="{B303C878-8799-4007-876A-6617B70F571A}" dt="2020-12-03T11:54:02.296" v="7896" actId="2711"/>
           <ac:spMkLst>
             <pc:docMk/>
             <pc:sldMk cId="2969362105" sldId="256"/>
@@ -4962,7 +4962,7 @@
           </ac:spMkLst>
         </pc:spChg>
         <pc:spChg chg="add mod">
-          <ac:chgData name="Fatima Pillosu" userId="a6295d4dc9e22643" providerId="LiveId" clId="{B303C878-8799-4007-876A-6617B70F571A}" dt="2020-12-03T09:59:07.009" v="7895" actId="1036"/>
+          <ac:chgData name="Fatima Pillosu" userId="a6295d4dc9e22643" providerId="LiveId" clId="{B303C878-8799-4007-876A-6617B70F571A}" dt="2020-12-03T11:54:02.296" v="7896" actId="2711"/>
           <ac:spMkLst>
             <pc:docMk/>
             <pc:sldMk cId="2969362105" sldId="256"/>
@@ -4970,7 +4970,7 @@
           </ac:spMkLst>
         </pc:spChg>
         <pc:spChg chg="add mod">
-          <ac:chgData name="Fatima Pillosu" userId="a6295d4dc9e22643" providerId="LiveId" clId="{B303C878-8799-4007-876A-6617B70F571A}" dt="2020-12-03T09:59:07.009" v="7895" actId="1036"/>
+          <ac:chgData name="Fatima Pillosu" userId="a6295d4dc9e22643" providerId="LiveId" clId="{B303C878-8799-4007-876A-6617B70F571A}" dt="2020-12-03T11:54:02.296" v="7896" actId="2711"/>
           <ac:spMkLst>
             <pc:docMk/>
             <pc:sldMk cId="2969362105" sldId="256"/>
@@ -4986,7 +4986,7 @@
           </ac:spMkLst>
         </pc:spChg>
         <pc:spChg chg="add mod">
-          <ac:chgData name="Fatima Pillosu" userId="a6295d4dc9e22643" providerId="LiveId" clId="{B303C878-8799-4007-876A-6617B70F571A}" dt="2020-12-03T09:59:07.009" v="7895" actId="1036"/>
+          <ac:chgData name="Fatima Pillosu" userId="a6295d4dc9e22643" providerId="LiveId" clId="{B303C878-8799-4007-876A-6617B70F571A}" dt="2020-12-03T11:54:02.296" v="7896" actId="2711"/>
           <ac:spMkLst>
             <pc:docMk/>
             <pc:sldMk cId="2969362105" sldId="256"/>
@@ -9657,7 +9657,7 @@
           <a:p>
             <a:fld id="{79798564-FF97-402E-A2A0-52C33396791A}" type="datetimeFigureOut">
               <a:rPr lang="en-GB" smtClean="0"/>
-              <a:t>02/12/2020</a:t>
+              <a:t>03/12/2020</a:t>
             </a:fld>
             <a:endParaRPr lang="en-GB"/>
           </a:p>
@@ -9827,7 +9827,7 @@
           <a:p>
             <a:fld id="{79798564-FF97-402E-A2A0-52C33396791A}" type="datetimeFigureOut">
               <a:rPr lang="en-GB" smtClean="0"/>
-              <a:t>02/12/2020</a:t>
+              <a:t>03/12/2020</a:t>
             </a:fld>
             <a:endParaRPr lang="en-GB"/>
           </a:p>
@@ -10007,7 +10007,7 @@
           <a:p>
             <a:fld id="{79798564-FF97-402E-A2A0-52C33396791A}" type="datetimeFigureOut">
               <a:rPr lang="en-GB" smtClean="0"/>
-              <a:t>02/12/2020</a:t>
+              <a:t>03/12/2020</a:t>
             </a:fld>
             <a:endParaRPr lang="en-GB"/>
           </a:p>
@@ -10177,7 +10177,7 @@
           <a:p>
             <a:fld id="{79798564-FF97-402E-A2A0-52C33396791A}" type="datetimeFigureOut">
               <a:rPr lang="en-GB" smtClean="0"/>
-              <a:t>02/12/2020</a:t>
+              <a:t>03/12/2020</a:t>
             </a:fld>
             <a:endParaRPr lang="en-GB"/>
           </a:p>
@@ -10421,7 +10421,7 @@
           <a:p>
             <a:fld id="{79798564-FF97-402E-A2A0-52C33396791A}" type="datetimeFigureOut">
               <a:rPr lang="en-GB" smtClean="0"/>
-              <a:t>02/12/2020</a:t>
+              <a:t>03/12/2020</a:t>
             </a:fld>
             <a:endParaRPr lang="en-GB"/>
           </a:p>
@@ -10653,7 +10653,7 @@
           <a:p>
             <a:fld id="{79798564-FF97-402E-A2A0-52C33396791A}" type="datetimeFigureOut">
               <a:rPr lang="en-GB" smtClean="0"/>
-              <a:t>02/12/2020</a:t>
+              <a:t>03/12/2020</a:t>
             </a:fld>
             <a:endParaRPr lang="en-GB"/>
           </a:p>
@@ -11020,7 +11020,7 @@
           <a:p>
             <a:fld id="{79798564-FF97-402E-A2A0-52C33396791A}" type="datetimeFigureOut">
               <a:rPr lang="en-GB" smtClean="0"/>
-              <a:t>02/12/2020</a:t>
+              <a:t>03/12/2020</a:t>
             </a:fld>
             <a:endParaRPr lang="en-GB"/>
           </a:p>
@@ -11138,7 +11138,7 @@
           <a:p>
             <a:fld id="{79798564-FF97-402E-A2A0-52C33396791A}" type="datetimeFigureOut">
               <a:rPr lang="en-GB" smtClean="0"/>
-              <a:t>02/12/2020</a:t>
+              <a:t>03/12/2020</a:t>
             </a:fld>
             <a:endParaRPr lang="en-GB"/>
           </a:p>
@@ -11233,7 +11233,7 @@
           <a:p>
             <a:fld id="{79798564-FF97-402E-A2A0-52C33396791A}" type="datetimeFigureOut">
               <a:rPr lang="en-GB" smtClean="0"/>
-              <a:t>02/12/2020</a:t>
+              <a:t>03/12/2020</a:t>
             </a:fld>
             <a:endParaRPr lang="en-GB"/>
           </a:p>
@@ -11510,7 +11510,7 @@
           <a:p>
             <a:fld id="{79798564-FF97-402E-A2A0-52C33396791A}" type="datetimeFigureOut">
               <a:rPr lang="en-GB" smtClean="0"/>
-              <a:t>02/12/2020</a:t>
+              <a:t>03/12/2020</a:t>
             </a:fld>
             <a:endParaRPr lang="en-GB"/>
           </a:p>
@@ -11767,7 +11767,7 @@
           <a:p>
             <a:fld id="{79798564-FF97-402E-A2A0-52C33396791A}" type="datetimeFigureOut">
               <a:rPr lang="en-GB" smtClean="0"/>
-              <a:t>02/12/2020</a:t>
+              <a:t>03/12/2020</a:t>
             </a:fld>
             <a:endParaRPr lang="en-GB"/>
           </a:p>
@@ -11980,7 +11980,7 @@
           <a:p>
             <a:fld id="{79798564-FF97-402E-A2A0-52C33396791A}" type="datetimeFigureOut">
               <a:rPr lang="en-GB" smtClean="0"/>
-              <a:t>02/12/2020</a:t>
+              <a:t>03/12/2020</a:t>
             </a:fld>
             <a:endParaRPr lang="en-GB"/>
           </a:p>
@@ -12489,7 +12489,6 @@
                     <a:lumOff val="35000"/>
                   </a:schemeClr>
                 </a:solidFill>
-                <a:latin typeface="Arial" panose="020B0604020202020204" pitchFamily="34" charset="0"/>
                 <a:cs typeface="Arial" panose="020B0604020202020204" pitchFamily="34" charset="0"/>
               </a:rPr>
               <a:t>MAYBE YES</a:t>
@@ -12606,7 +12605,6 @@
                     <a:lumOff val="35000"/>
                   </a:schemeClr>
                 </a:solidFill>
-                <a:latin typeface="Arial" panose="020B0604020202020204" pitchFamily="34" charset="0"/>
                 <a:cs typeface="Arial" panose="020B0604020202020204" pitchFamily="34" charset="0"/>
               </a:rPr>
               <a:t>Experiment Starts</a:t>
@@ -12720,7 +12718,6 @@
                     <a:lumOff val="35000"/>
                   </a:schemeClr>
                 </a:solidFill>
-                <a:latin typeface="Arial" panose="020B0604020202020204" pitchFamily="34" charset="0"/>
                 <a:cs typeface="Arial" panose="020B0604020202020204" pitchFamily="34" charset="0"/>
               </a:rPr>
               <a:t>Provision of ecPoint remote training to volunteer testers using traditional guidelines for interpreting PEFs.</a:t>
@@ -12834,7 +12831,6 @@
                     <a:lumOff val="35000"/>
                   </a:schemeClr>
                 </a:solidFill>
-                <a:latin typeface="Arial" panose="020B0604020202020204" pitchFamily="34" charset="0"/>
                 <a:cs typeface="Arial" panose="020B0604020202020204" pitchFamily="34" charset="0"/>
               </a:rPr>
               <a:t>Submission of a written summary on ecPoint performance predicting extreme localized rainfall events.</a:t>
@@ -12904,7 +12900,6 @@
                     <a:lumOff val="35000"/>
                   </a:schemeClr>
                 </a:solidFill>
-                <a:latin typeface="Arial" panose="020B0604020202020204" pitchFamily="34" charset="0"/>
                 <a:cs typeface="Arial" panose="020B0604020202020204" pitchFamily="34" charset="0"/>
               </a:rPr>
               <a:t>Analysis of independent evaluation for ecPoint forecasts.</a:t>
@@ -13018,7 +13013,6 @@
                     <a:lumOff val="35000"/>
                   </a:schemeClr>
                 </a:solidFill>
-                <a:latin typeface="Arial" panose="020B0604020202020204" pitchFamily="34" charset="0"/>
                 <a:cs typeface="Arial" panose="020B0604020202020204" pitchFamily="34" charset="0"/>
               </a:rPr>
               <a:t>Remote joint evaluation about why the training provided on ecPoint did not allow forecasters to use the forecasts more effectively.</a:t>
@@ -13088,7 +13082,6 @@
                     <a:lumOff val="35000"/>
                   </a:schemeClr>
                 </a:solidFill>
-                <a:latin typeface="Arial" panose="020B0604020202020204" pitchFamily="34" charset="0"/>
                 <a:cs typeface="Arial" panose="020B0604020202020204" pitchFamily="34" charset="0"/>
               </a:rPr>
               <a:t>Formulation of new ecPoint-tailored guidelines.</a:t>
@@ -13248,7 +13241,6 @@
                     <a:lumOff val="35000"/>
                   </a:schemeClr>
                 </a:solidFill>
-                <a:latin typeface="Arial" panose="020B0604020202020204" pitchFamily="34" charset="0"/>
                 <a:cs typeface="Arial" panose="020B0604020202020204" pitchFamily="34" charset="0"/>
               </a:rPr>
               <a:t>Joint revision of the case studies proposed by the volunteer testers under the revised guidelines for interpreting ecPoint.</a:t>
@@ -13449,7 +13441,6 @@
                     <a:lumOff val="35000"/>
                   </a:schemeClr>
                 </a:solidFill>
-                <a:latin typeface="Arial" panose="020B0604020202020204" pitchFamily="34" charset="0"/>
                 <a:cs typeface="Arial" panose="020B0604020202020204" pitchFamily="34" charset="0"/>
               </a:rPr>
               <a:t>Publication of revised ecPoint guidelines</a:t>
@@ -13561,7 +13552,6 @@
                     <a:lumOff val="35000"/>
                   </a:schemeClr>
                 </a:solidFill>
-                <a:latin typeface="Arial" panose="020B0604020202020204" pitchFamily="34" charset="0"/>
                 <a:cs typeface="Arial" panose="020B0604020202020204" pitchFamily="34" charset="0"/>
               </a:rPr>
               <a:t>YES</a:t>
@@ -13628,7 +13618,6 @@
                   <a:lumOff val="35000"/>
                 </a:schemeClr>
               </a:solidFill>
-              <a:latin typeface="Arial" panose="020B0604020202020204" pitchFamily="34" charset="0"/>
               <a:cs typeface="Arial" panose="020B0604020202020204" pitchFamily="34" charset="0"/>
             </a:endParaRPr>
           </a:p>
@@ -13687,7 +13676,6 @@
                   <a:lumOff val="35000"/>
                 </a:schemeClr>
               </a:solidFill>
-              <a:latin typeface="Arial" panose="020B0604020202020204" pitchFamily="34" charset="0"/>
               <a:cs typeface="Arial" panose="020B0604020202020204" pitchFamily="34" charset="0"/>
             </a:endParaRPr>
           </a:p>
@@ -13701,7 +13689,6 @@
                     <a:lumOff val="35000"/>
                   </a:schemeClr>
                 </a:solidFill>
-                <a:latin typeface="Arial" panose="020B0604020202020204" pitchFamily="34" charset="0"/>
                 <a:cs typeface="Arial" panose="020B0604020202020204" pitchFamily="34" charset="0"/>
               </a:rPr>
               <a:t>Can traditional guidelines for interpreting PEFs be effectively used also to understand ecPoint forecasts?</a:t>
@@ -13771,7 +13758,6 @@
                     <a:lumOff val="35000"/>
                   </a:schemeClr>
                 </a:solidFill>
-                <a:latin typeface="Arial" panose="020B0604020202020204" pitchFamily="34" charset="0"/>
                 <a:cs typeface="Arial" panose="020B0604020202020204" pitchFamily="34" charset="0"/>
               </a:rPr>
               <a:t>Use of ecPoint-Rainfall in an operational environment to predict extreme localized rainfall events.</a:t>
@@ -14197,7 +14183,6 @@
                     <a:lumOff val="35000"/>
                   </a:schemeClr>
                 </a:solidFill>
-                <a:latin typeface="Arial" panose="020B0604020202020204" pitchFamily="34" charset="0"/>
                 <a:cs typeface="Arial" panose="020B0604020202020204" pitchFamily="34" charset="0"/>
               </a:rPr>
               <a:t>YES</a:t>
@@ -14311,7 +14296,6 @@
                     <a:lumOff val="35000"/>
                   </a:schemeClr>
                 </a:solidFill>
-                <a:latin typeface="Arial" panose="020B0604020202020204" pitchFamily="34" charset="0"/>
                 <a:cs typeface="Arial" panose="020B0604020202020204" pitchFamily="34" charset="0"/>
               </a:rPr>
               <a:t>NO</a:t>
@@ -14439,7 +14423,6 @@
                     <a:lumOff val="35000"/>
                   </a:schemeClr>
                 </a:solidFill>
-                <a:latin typeface="Arial" panose="020B0604020202020204" pitchFamily="34" charset="0"/>
                 <a:cs typeface="Arial" panose="020B0604020202020204" pitchFamily="34" charset="0"/>
               </a:rPr>
               <a:t>NO</a:t>
@@ -14502,7 +14485,6 @@
                     <a:lumOff val="35000"/>
                   </a:schemeClr>
                 </a:solidFill>
-                <a:latin typeface="Arial" panose="020B0604020202020204" pitchFamily="34" charset="0"/>
                 <a:cs typeface="Arial" panose="020B0604020202020204" pitchFamily="34" charset="0"/>
               </a:rPr>
               <a:t>ecPoint Developers</a:t>
@@ -14565,7 +14547,6 @@
                     <a:lumOff val="35000"/>
                   </a:schemeClr>
                 </a:solidFill>
-                <a:latin typeface="Arial" panose="020B0604020202020204" pitchFamily="34" charset="0"/>
                 <a:cs typeface="Arial" panose="020B0604020202020204" pitchFamily="34" charset="0"/>
               </a:rPr>
               <a:t>Volunteer Testers</a:t>
@@ -14628,7 +14609,6 @@
                     <a:lumOff val="35000"/>
                   </a:schemeClr>
                 </a:solidFill>
-                <a:latin typeface="Arial" panose="020B0604020202020204" pitchFamily="34" charset="0"/>
                 <a:cs typeface="Arial" panose="020B0604020202020204" pitchFamily="34" charset="0"/>
               </a:rPr>
               <a:t>Developers &amp; Testers</a:t>
@@ -14822,7 +14802,6 @@
                     <a:lumOff val="35000"/>
                   </a:schemeClr>
                 </a:solidFill>
-                <a:latin typeface="Arial" panose="020B0604020202020204" pitchFamily="34" charset="0"/>
                 <a:cs typeface="Arial" panose="020B0604020202020204" pitchFamily="34" charset="0"/>
               </a:rPr>
               <a:t>Research Question</a:t>
@@ -14889,7 +14868,6 @@
                   <a:lumOff val="35000"/>
                 </a:schemeClr>
               </a:solidFill>
-              <a:latin typeface="Arial" panose="020B0604020202020204" pitchFamily="34" charset="0"/>
               <a:cs typeface="Arial" panose="020B0604020202020204" pitchFamily="34" charset="0"/>
             </a:endParaRPr>
           </a:p>
@@ -14948,7 +14926,6 @@
                   <a:lumOff val="35000"/>
                 </a:schemeClr>
               </a:solidFill>
-              <a:latin typeface="Arial" panose="020B0604020202020204" pitchFamily="34" charset="0"/>
               <a:cs typeface="Arial" panose="020B0604020202020204" pitchFamily="34" charset="0"/>
             </a:endParaRPr>
           </a:p>
@@ -14962,7 +14939,6 @@
                     <a:lumOff val="35000"/>
                   </a:schemeClr>
                 </a:solidFill>
-                <a:latin typeface="Arial" panose="020B0604020202020204" pitchFamily="34" charset="0"/>
                 <a:cs typeface="Arial" panose="020B0604020202020204" pitchFamily="34" charset="0"/>
               </a:rPr>
               <a:t>Is ecPoint’s UND-EFF relationship similar to the one for PEFs?</a:t>
@@ -15029,7 +15005,6 @@
                   <a:lumOff val="35000"/>
                 </a:schemeClr>
               </a:solidFill>
-              <a:latin typeface="Arial" panose="020B0604020202020204" pitchFamily="34" charset="0"/>
               <a:cs typeface="Arial" panose="020B0604020202020204" pitchFamily="34" charset="0"/>
             </a:endParaRPr>
           </a:p>
@@ -15088,7 +15063,6 @@
                   <a:lumOff val="35000"/>
                 </a:schemeClr>
               </a:solidFill>
-              <a:latin typeface="Arial" panose="020B0604020202020204" pitchFamily="34" charset="0"/>
               <a:cs typeface="Arial" panose="020B0604020202020204" pitchFamily="34" charset="0"/>
             </a:endParaRPr>
           </a:p>
@@ -15102,7 +15076,6 @@
                     <a:lumOff val="35000"/>
                   </a:schemeClr>
                 </a:solidFill>
-                <a:latin typeface="Arial" panose="020B0604020202020204" pitchFamily="34" charset="0"/>
                 <a:cs typeface="Arial" panose="020B0604020202020204" pitchFamily="34" charset="0"/>
               </a:rPr>
               <a:t>Are ecPoint forecasts more effectively explained with the revised guidelines?</a:t>
@@ -15219,7 +15192,6 @@
                     <a:lumOff val="35000"/>
                   </a:schemeClr>
                 </a:solidFill>
-                <a:latin typeface="Arial" panose="020B0604020202020204" pitchFamily="34" charset="0"/>
                 <a:cs typeface="Arial" panose="020B0604020202020204" pitchFamily="34" charset="0"/>
               </a:rPr>
               <a:t>Experiment Ends</a:t>
@@ -15290,7 +15262,6 @@
                     <a:lumOff val="35000"/>
                   </a:schemeClr>
                 </a:solidFill>
-                <a:latin typeface="Arial" panose="020B0604020202020204" pitchFamily="34" charset="0"/>
                 <a:cs typeface="Arial" panose="020B0604020202020204" pitchFamily="34" charset="0"/>
               </a:rPr>
               <a:t>No need to revise PEFs’ traditional guidelines to communicate ecPoint forecasts.</a:t>
@@ -15358,7 +15329,6 @@
                     <a:lumOff val="35000"/>
                   </a:schemeClr>
                 </a:solidFill>
-                <a:latin typeface="Arial" panose="020B0604020202020204" pitchFamily="34" charset="0"/>
                 <a:cs typeface="Arial" panose="020B0604020202020204" pitchFamily="34" charset="0"/>
               </a:rPr>
               <a:t>MAYBE NOT</a:t>
@@ -15470,7 +15440,6 @@
                     <a:lumOff val="35000"/>
                   </a:schemeClr>
                 </a:solidFill>
-                <a:latin typeface="Arial" panose="020B0604020202020204" pitchFamily="34" charset="0"/>
                 <a:cs typeface="Arial" panose="020B0604020202020204" pitchFamily="34" charset="0"/>
               </a:rPr>
               <a:t>OFFLINE PHASE</a:t>
@@ -15486,7 +15455,6 @@
                     <a:lumOff val="35000"/>
                   </a:schemeClr>
                 </a:solidFill>
-                <a:latin typeface="Arial" panose="020B0604020202020204" pitchFamily="34" charset="0"/>
                 <a:cs typeface="Arial" panose="020B0604020202020204" pitchFamily="34" charset="0"/>
               </a:rPr>
               <a:t>(15 months)</a:t>
@@ -15557,7 +15525,6 @@
                     <a:lumOff val="35000"/>
                   </a:schemeClr>
                 </a:solidFill>
-                <a:latin typeface="Arial" panose="020B0604020202020204" pitchFamily="34" charset="0"/>
                 <a:cs typeface="Arial" panose="020B0604020202020204" pitchFamily="34" charset="0"/>
               </a:rPr>
               <a:t>No actions would be needed.</a:t>
@@ -15669,7 +15636,6 @@
                     <a:lumOff val="35000"/>
                   </a:schemeClr>
                 </a:solidFill>
-                <a:latin typeface="Arial" panose="020B0604020202020204" pitchFamily="34" charset="0"/>
                 <a:cs typeface="Arial" panose="020B0604020202020204" pitchFamily="34" charset="0"/>
               </a:rPr>
               <a:t>REAL-TIME PHASE</a:t>
@@ -15685,7 +15651,6 @@
                     <a:lumOff val="35000"/>
                   </a:schemeClr>
                 </a:solidFill>
-                <a:latin typeface="Arial" panose="020B0604020202020204" pitchFamily="34" charset="0"/>
                 <a:cs typeface="Arial" panose="020B0604020202020204" pitchFamily="34" charset="0"/>
               </a:rPr>
               <a:t>(12 months)</a:t>
@@ -15805,7 +15770,6 @@
                     <a:lumOff val="35000"/>
                   </a:schemeClr>
                 </a:solidFill>
-                <a:latin typeface="Arial" panose="020B0604020202020204" pitchFamily="34" charset="0"/>
                 <a:cs typeface="Arial" panose="020B0604020202020204" pitchFamily="34" charset="0"/>
               </a:rPr>
               <a:t>YES</a:t>

</xml_diff>